<commit_message>
add and ignore .MOV files
</commit_message>
<xml_diff>
--- a/text_editing/Yitong_texting/ACCURACY.pptx
+++ b/text_editing/Yitong_texting/ACCURACY.pptx
@@ -7,6 +7,7 @@
   <p:sldIdLst>
     <p:sldId id="256" r:id="rId3"/>
     <p:sldId id="257" r:id="rId4"/>
+    <p:sldId id="258" r:id="rId5"/>
   </p:sldIdLst>
   <p:sldSz cx="12192000" cy="6858000"/>
   <p:notesSz cx="6858000" cy="9144000"/>
@@ -3147,7 +3148,7 @@
         </p:nvSpPr>
         <p:spPr>
           <a:xfrm>
-            <a:off x="3757295" y="4729480"/>
+            <a:off x="4145915" y="4729480"/>
             <a:ext cx="1191260" cy="1027430"/>
           </a:xfrm>
           <a:prstGeom prst="ellipse">
@@ -3177,20 +3178,32 @@
         <p:txBody>
           <a:bodyPr rtlCol="0" anchor="ctr"/>
           <a:p>
-            <a:pPr algn="ctr"/>
-            <a:r>
-              <a:rPr lang="de-DE" altLang="zh-CN" sz="1400"/>
+            <a:pPr algn="ctr">
+              <a:buNone/>
+            </a:pPr>
+            <a:r>
+              <a:rPr lang="de-DE" altLang="zh-CN" sz="900">
+                <a:latin typeface="Times New Roman" panose="02020603050405020304" charset="0"/>
+              </a:rPr>
               <a:t>OM</a:t>
             </a:r>
-            <a:endParaRPr lang="de-DE" altLang="zh-CN" sz="1400"/>
-          </a:p>
-          <a:p>
-            <a:pPr algn="ctr"/>
-            <a:r>
-              <a:rPr lang="de-DE" altLang="zh-CN" sz="1400"/>
+            <a:endParaRPr lang="de-DE" altLang="zh-CN" sz="900">
+              <a:latin typeface="Times New Roman" panose="02020603050405020304" charset="0"/>
+            </a:endParaRPr>
+          </a:p>
+          <a:p>
+            <a:pPr algn="ctr">
+              <a:buNone/>
+            </a:pPr>
+            <a:r>
+              <a:rPr lang="de-DE" altLang="zh-CN" sz="900">
+                <a:latin typeface="Times New Roman" panose="02020603050405020304" charset="0"/>
+              </a:rPr>
               <a:t>0.21 m</a:t>
             </a:r>
-            <a:endParaRPr lang="de-DE" altLang="zh-CN" sz="1400"/>
+            <a:endParaRPr lang="de-DE" altLang="zh-CN" sz="900">
+              <a:latin typeface="Times New Roman" panose="02020603050405020304" charset="0"/>
+            </a:endParaRPr>
           </a:p>
         </p:txBody>
       </p:sp>
@@ -3202,7 +3215,7 @@
         </p:nvSpPr>
         <p:spPr>
           <a:xfrm>
-            <a:off x="4623435" y="4729480"/>
+            <a:off x="5045075" y="4729480"/>
             <a:ext cx="1267460" cy="1027430"/>
           </a:xfrm>
           <a:prstGeom prst="ellipse">
@@ -3232,20 +3245,32 @@
         <p:txBody>
           <a:bodyPr rtlCol="0" anchor="ctr"/>
           <a:p>
-            <a:pPr algn="ctr"/>
-            <a:r>
-              <a:rPr lang="de-DE" altLang="zh-CN" sz="1400"/>
+            <a:pPr algn="ctr">
+              <a:buNone/>
+            </a:pPr>
+            <a:r>
+              <a:rPr lang="de-DE" altLang="zh-CN" sz="1000">
+                <a:latin typeface="Times New Roman" panose="02020603050405020304" charset="0"/>
+              </a:rPr>
               <a:t>EKF-MC1</a:t>
             </a:r>
-            <a:endParaRPr lang="de-DE" altLang="zh-CN" sz="1400"/>
-          </a:p>
-          <a:p>
-            <a:pPr algn="ctr"/>
-            <a:r>
-              <a:rPr lang="de-DE" altLang="zh-CN" sz="1400"/>
+            <a:endParaRPr lang="de-DE" altLang="zh-CN" sz="1000">
+              <a:latin typeface="Times New Roman" panose="02020603050405020304" charset="0"/>
+            </a:endParaRPr>
+          </a:p>
+          <a:p>
+            <a:pPr algn="ctr">
+              <a:buNone/>
+            </a:pPr>
+            <a:r>
+              <a:rPr lang="de-DE" altLang="zh-CN" sz="1000">
+                <a:latin typeface="Times New Roman" panose="02020603050405020304" charset="0"/>
+              </a:rPr>
               <a:t>0.22 m</a:t>
             </a:r>
-            <a:endParaRPr lang="de-DE" altLang="zh-CN" sz="1400"/>
+            <a:endParaRPr lang="de-DE" altLang="zh-CN" sz="1000">
+              <a:latin typeface="Times New Roman" panose="02020603050405020304" charset="0"/>
+            </a:endParaRPr>
           </a:p>
         </p:txBody>
       </p:sp>
@@ -3257,8 +3282,8 @@
         </p:nvSpPr>
         <p:spPr>
           <a:xfrm>
-            <a:off x="5603240" y="4729480"/>
-            <a:ext cx="1228090" cy="1027430"/>
+            <a:off x="6196330" y="4729480"/>
+            <a:ext cx="1334770" cy="1027430"/>
           </a:xfrm>
           <a:prstGeom prst="ellipse">
             <a:avLst/>
@@ -3287,20 +3312,32 @@
         <p:txBody>
           <a:bodyPr rtlCol="0" anchor="ctr"/>
           <a:p>
-            <a:pPr algn="ctr"/>
-            <a:r>
-              <a:rPr lang="de-DE" altLang="zh-CN" sz="1400"/>
+            <a:pPr algn="ctr">
+              <a:buNone/>
+            </a:pPr>
+            <a:r>
+              <a:rPr lang="de-DE" altLang="zh-CN" sz="1200">
+                <a:latin typeface="Times New Roman" panose="02020603050405020304" charset="0"/>
+              </a:rPr>
               <a:t>EKF-MC2</a:t>
             </a:r>
-            <a:endParaRPr lang="de-DE" altLang="zh-CN" sz="1400"/>
-          </a:p>
-          <a:p>
-            <a:pPr algn="ctr"/>
-            <a:r>
-              <a:rPr lang="de-DE" altLang="zh-CN" sz="1400"/>
+            <a:endParaRPr lang="de-DE" altLang="zh-CN" sz="1200">
+              <a:latin typeface="Times New Roman" panose="02020603050405020304" charset="0"/>
+            </a:endParaRPr>
+          </a:p>
+          <a:p>
+            <a:pPr algn="ctr">
+              <a:buNone/>
+            </a:pPr>
+            <a:r>
+              <a:rPr lang="de-DE" altLang="zh-CN" sz="1200">
+                <a:latin typeface="Times New Roman" panose="02020603050405020304" charset="0"/>
+              </a:rPr>
               <a:t>0.25 m</a:t>
             </a:r>
-            <a:endParaRPr lang="de-DE" altLang="zh-CN" sz="1400"/>
+            <a:endParaRPr lang="de-DE" altLang="zh-CN" sz="1200">
+              <a:latin typeface="Times New Roman" panose="02020603050405020304" charset="0"/>
+            </a:endParaRPr>
           </a:p>
         </p:txBody>
       </p:sp>
@@ -3344,18 +3381,26 @@
           <a:p>
             <a:pPr algn="ctr"/>
             <a:r>
-              <a:rPr lang="de-DE" altLang="zh-CN" sz="1400"/>
+              <a:rPr lang="de-DE" altLang="zh-CN">
+                <a:latin typeface="Times New Roman" panose="02020603050405020304" charset="0"/>
+              </a:rPr>
               <a:t>[7], [8]</a:t>
             </a:r>
-            <a:endParaRPr lang="de-DE" altLang="zh-CN" sz="1400"/>
+            <a:endParaRPr lang="de-DE" altLang="zh-CN">
+              <a:latin typeface="Times New Roman" panose="02020603050405020304" charset="0"/>
+            </a:endParaRPr>
           </a:p>
           <a:p>
             <a:pPr algn="ctr"/>
             <a:r>
-              <a:rPr lang="de-DE" altLang="zh-CN" sz="1400"/>
+              <a:rPr lang="de-DE" altLang="zh-CN">
+                <a:latin typeface="Times New Roman" panose="02020603050405020304" charset="0"/>
+              </a:rPr>
               <a:t>0.1 m</a:t>
             </a:r>
-            <a:endParaRPr lang="de-DE" altLang="zh-CN" sz="1400"/>
+            <a:endParaRPr lang="de-DE" altLang="zh-CN">
+              <a:latin typeface="Times New Roman" panose="02020603050405020304" charset="0"/>
+            </a:endParaRPr>
           </a:p>
         </p:txBody>
       </p:sp>
@@ -3367,7 +3412,7 @@
         </p:nvSpPr>
         <p:spPr>
           <a:xfrm>
-            <a:off x="6419215" y="3363595"/>
+            <a:off x="7304405" y="3363595"/>
             <a:ext cx="1379855" cy="1027430"/>
           </a:xfrm>
           <a:prstGeom prst="ellipse">
@@ -3397,20 +3442,32 @@
         <p:txBody>
           <a:bodyPr rtlCol="0" anchor="ctr"/>
           <a:p>
-            <a:pPr algn="ctr"/>
-            <a:r>
-              <a:rPr lang="de-DE" altLang="zh-CN" sz="1400"/>
+            <a:pPr algn="ctr">
+              <a:buNone/>
+            </a:pPr>
+            <a:r>
+              <a:rPr lang="de-DE" altLang="zh-CN" sz="1600">
+                <a:latin typeface="Times New Roman" panose="02020603050405020304" charset="0"/>
+              </a:rPr>
               <a:t>ASSIST[11]</a:t>
             </a:r>
-            <a:endParaRPr lang="de-DE" altLang="zh-CN" sz="1400"/>
-          </a:p>
-          <a:p>
-            <a:pPr algn="ctr"/>
-            <a:r>
-              <a:rPr lang="de-DE" altLang="zh-CN" sz="1400"/>
+            <a:endParaRPr lang="de-DE" altLang="zh-CN" sz="1600">
+              <a:latin typeface="Times New Roman" panose="02020603050405020304" charset="0"/>
+            </a:endParaRPr>
+          </a:p>
+          <a:p>
+            <a:pPr algn="ctr">
+              <a:buNone/>
+            </a:pPr>
+            <a:r>
+              <a:rPr lang="de-DE" altLang="zh-CN" sz="1600">
+                <a:latin typeface="Times New Roman" panose="02020603050405020304" charset="0"/>
+              </a:rPr>
               <a:t>0.29 m</a:t>
             </a:r>
-            <a:endParaRPr lang="de-DE" altLang="zh-CN" sz="1400"/>
+            <a:endParaRPr lang="de-DE" altLang="zh-CN" sz="1600">
+              <a:latin typeface="Times New Roman" panose="02020603050405020304" charset="0"/>
+            </a:endParaRPr>
           </a:p>
         </p:txBody>
       </p:sp>
@@ -3562,20 +3619,32 @@
         <p:txBody>
           <a:bodyPr rtlCol="0" anchor="ctr"/>
           <a:p>
-            <a:pPr algn="ctr"/>
-            <a:r>
-              <a:rPr lang="de-DE" altLang="zh-CN" sz="1400"/>
+            <a:pPr algn="ctr">
+              <a:buNone/>
+            </a:pPr>
+            <a:r>
+              <a:rPr lang="de-DE" altLang="zh-CN" sz="1400">
+                <a:latin typeface="Times New Roman" panose="02020603050405020304" charset="0"/>
+              </a:rPr>
               <a:t>[2]</a:t>
             </a:r>
-            <a:endParaRPr lang="de-DE" altLang="zh-CN" sz="1400"/>
-          </a:p>
-          <a:p>
-            <a:pPr algn="ctr"/>
-            <a:r>
-              <a:rPr lang="de-DE" altLang="zh-CN" sz="1400"/>
+            <a:endParaRPr lang="de-DE" altLang="zh-CN" sz="1400">
+              <a:latin typeface="Times New Roman" panose="02020603050405020304" charset="0"/>
+            </a:endParaRPr>
+          </a:p>
+          <a:p>
+            <a:pPr algn="ctr">
+              <a:buNone/>
+            </a:pPr>
+            <a:r>
+              <a:rPr lang="de-DE" altLang="zh-CN" sz="1400">
+                <a:latin typeface="Times New Roman" panose="02020603050405020304" charset="0"/>
+              </a:rPr>
               <a:t>4.9 m</a:t>
             </a:r>
-            <a:endParaRPr lang="de-DE" altLang="zh-CN" sz="1400"/>
+            <a:endParaRPr lang="de-DE" altLang="zh-CN" sz="1400">
+              <a:latin typeface="Times New Roman" panose="02020603050405020304" charset="0"/>
+            </a:endParaRPr>
           </a:p>
         </p:txBody>
       </p:sp>
@@ -3617,20 +3686,97 @@
         <p:txBody>
           <a:bodyPr rtlCol="0" anchor="ctr"/>
           <a:p>
-            <a:pPr algn="ctr"/>
-            <a:r>
-              <a:rPr lang="de-DE" altLang="zh-CN" sz="1400"/>
+            <a:pPr algn="ctr">
+              <a:buNone/>
+            </a:pPr>
+            <a:r>
+              <a:rPr lang="de-DE" altLang="zh-CN" sz="1400">
+                <a:latin typeface="Times New Roman" panose="02020603050405020304" charset="0"/>
+              </a:rPr>
               <a:t>[3]</a:t>
             </a:r>
+            <a:endParaRPr lang="de-DE" altLang="zh-CN" sz="1400">
+              <a:latin typeface="Times New Roman" panose="02020603050405020304" charset="0"/>
+            </a:endParaRPr>
+          </a:p>
+          <a:p>
+            <a:pPr algn="ctr">
+              <a:buNone/>
+            </a:pPr>
+            <a:r>
+              <a:rPr lang="de-DE" altLang="zh-CN" sz="1400">
+                <a:latin typeface="Times New Roman" panose="02020603050405020304" charset="0"/>
+              </a:rPr>
+              <a:t>1.9 m</a:t>
+            </a:r>
             <a:endParaRPr lang="de-DE" altLang="zh-CN" sz="1400"/>
           </a:p>
-          <a:p>
-            <a:pPr algn="ctr"/>
-            <a:r>
-              <a:rPr lang="de-DE" altLang="zh-CN" sz="1400"/>
-              <a:t>1.9 m</a:t>
-            </a:r>
-            <a:endParaRPr lang="de-DE" altLang="zh-CN" sz="1400"/>
+        </p:txBody>
+      </p:sp>
+      <p:sp>
+        <p:nvSpPr>
+          <p:cNvPr id="2" name="椭圆 1"/>
+          <p:cNvSpPr/>
+          <p:nvPr/>
+        </p:nvSpPr>
+        <p:spPr>
+          <a:xfrm>
+            <a:off x="3188970" y="4729480"/>
+            <a:ext cx="1267460" cy="1027430"/>
+          </a:xfrm>
+          <a:prstGeom prst="ellipse">
+            <a:avLst/>
+          </a:prstGeom>
+          <a:solidFill>
+            <a:schemeClr val="accent4">
+              <a:lumMod val="60000"/>
+              <a:lumOff val="40000"/>
+            </a:schemeClr>
+          </a:solidFill>
+        </p:spPr>
+        <p:style>
+          <a:lnRef idx="1">
+            <a:schemeClr val="accent2"/>
+          </a:lnRef>
+          <a:fillRef idx="2">
+            <a:schemeClr val="accent2"/>
+          </a:fillRef>
+          <a:effectRef idx="1">
+            <a:schemeClr val="accent2"/>
+          </a:effectRef>
+          <a:fontRef idx="minor">
+            <a:schemeClr val="dk1"/>
+          </a:fontRef>
+        </p:style>
+        <p:txBody>
+          <a:bodyPr rtlCol="0" anchor="ctr"/>
+          <a:p>
+            <a:pPr algn="ctr">
+              <a:buNone/>
+            </a:pPr>
+            <a:r>
+              <a:rPr lang="de-DE" altLang="zh-CN" sz="1400">
+                <a:latin typeface="Times New Roman" panose="02020603050405020304" charset="0"/>
+              </a:rPr>
+              <a:t>EKF-LWCR</a:t>
+            </a:r>
+            <a:endParaRPr lang="de-DE" altLang="zh-CN" sz="1400">
+              <a:latin typeface="Times New Roman" panose="02020603050405020304" charset="0"/>
+            </a:endParaRPr>
+          </a:p>
+          <a:p>
+            <a:pPr algn="ctr">
+              <a:buNone/>
+            </a:pPr>
+            <a:r>
+              <a:rPr lang="de-DE" altLang="zh-CN" sz="1400" i="1">
+                <a:latin typeface="Times New Roman" panose="02020603050405020304" charset="0"/>
+              </a:rPr>
+              <a:t>0.20 m</a:t>
+            </a:r>
+            <a:endParaRPr lang="de-DE" altLang="zh-CN" sz="1400" i="1">
+              <a:latin typeface="Times New Roman" panose="02020603050405020304" charset="0"/>
+            </a:endParaRPr>
           </a:p>
         </p:txBody>
       </p:sp>
@@ -4368,6 +4514,1684 @@
               <a:t>1.9 m</a:t>
             </a:r>
             <a:endParaRPr lang="de-DE" altLang="zh-CN" sz="1400"/>
+          </a:p>
+        </p:txBody>
+      </p:sp>
+    </p:spTree>
+  </p:cSld>
+  <p:clrMapOvr>
+    <a:masterClrMapping/>
+  </p:clrMapOvr>
+</p:sld>
+</file>
+
+<file path=ppt/slides/slide3.xml><?xml version="1.0" encoding="utf-8"?>
+<p:sld xmlns:a="http://schemas.openxmlformats.org/drawingml/2006/main" xmlns:r="http://schemas.openxmlformats.org/officeDocument/2006/relationships" xmlns:p="http://schemas.openxmlformats.org/presentationml/2006/main">
+  <p:cSld>
+    <p:spTree>
+      <p:nvGrpSpPr>
+        <p:cNvPr id="1" name=""/>
+        <p:cNvGrpSpPr/>
+        <p:nvPr/>
+      </p:nvGrpSpPr>
+      <p:grpSpPr/>
+      <p:pic>
+        <p:nvPicPr>
+          <p:cNvPr id="14" name="图片 13" descr="ACCURACY_plot"/>
+          <p:cNvPicPr>
+            <a:picLocks noChangeAspect="1"/>
+          </p:cNvPicPr>
+          <p:nvPr/>
+        </p:nvPicPr>
+        <p:blipFill>
+          <a:blip r:embed="rId1"/>
+          <a:srcRect l="3643" t="154" r="1629"/>
+          <a:stretch>
+            <a:fillRect/>
+          </a:stretch>
+        </p:blipFill>
+        <p:spPr>
+          <a:xfrm>
+            <a:off x="2218055" y="689610"/>
+            <a:ext cx="9528175" cy="5367020"/>
+          </a:xfrm>
+          <a:prstGeom prst="rect">
+            <a:avLst/>
+          </a:prstGeom>
+        </p:spPr>
+      </p:pic>
+      <p:sp>
+        <p:nvSpPr>
+          <p:cNvPr id="20" name="文本框 19"/>
+          <p:cNvSpPr txBox="1"/>
+          <p:nvPr/>
+        </p:nvSpPr>
+        <p:spPr>
+          <a:xfrm>
+            <a:off x="4191635" y="3667125"/>
+            <a:ext cx="731520" cy="368300"/>
+          </a:xfrm>
+          <a:prstGeom prst="rect">
+            <a:avLst/>
+          </a:prstGeom>
+          <a:solidFill>
+            <a:schemeClr val="bg1"/>
+          </a:solidFill>
+        </p:spPr>
+        <p:txBody>
+          <a:bodyPr wrap="square" rtlCol="0">
+            <a:spAutoFit/>
+          </a:bodyPr>
+          <a:p>
+            <a:endParaRPr lang="zh-CN" altLang="en-US"/>
+          </a:p>
+        </p:txBody>
+      </p:sp>
+      <p:graphicFrame>
+        <p:nvGraphicFramePr>
+          <p:cNvPr id="4" name="表格 3"/>
+          <p:cNvGraphicFramePr/>
+          <p:nvPr/>
+        </p:nvGraphicFramePr>
+        <p:xfrm>
+          <a:off x="103505" y="824865"/>
+          <a:ext cx="11609705" cy="4462780"/>
+        </p:xfrm>
+        <a:graphic>
+          <a:graphicData uri="http://schemas.openxmlformats.org/drawingml/2006/table">
+            <a:tbl>
+              <a:tblPr firstRow="1" bandRow="1">
+                <a:tableStyleId>{5C22544A-7EE6-4342-B048-85BDC9FD1C3A}</a:tableStyleId>
+              </a:tblPr>
+              <a:tblGrid>
+                <a:gridCol w="2085340"/>
+                <a:gridCol w="9524365"/>
+              </a:tblGrid>
+              <a:tr h="942340">
+                <a:tc>
+                  <a:txBody>
+                    <a:bodyPr/>
+                    <a:p>
+                      <a:pPr algn="r">
+                        <a:buNone/>
+                      </a:pPr>
+                      <a:r>
+                        <a:rPr lang="de-DE" sz="2400" b="0">
+                          <a:solidFill>
+                            <a:schemeClr val="dk1"/>
+                          </a:solidFill>
+                          <a:latin typeface="Times New Roman" panose="02020603050405020304" charset="0"/>
+                          <a:sym typeface="+mn-ea"/>
+                        </a:rPr>
+                        <a:t>GPS</a:t>
+                      </a:r>
+                      <a:endParaRPr lang="de-DE" altLang="zh-CN" sz="2400" b="0">
+                        <a:solidFill>
+                          <a:schemeClr val="tx1"/>
+                        </a:solidFill>
+                        <a:latin typeface="Times New Roman" panose="02020603050405020304" charset="0"/>
+                        <a:sym typeface="+mn-ea"/>
+                      </a:endParaRPr>
+                    </a:p>
+                  </a:txBody>
+                  <a:tcPr anchor="ctr" anchorCtr="0">
+                    <a:noFill/>
+                  </a:tcPr>
+                </a:tc>
+                <a:tc>
+                  <a:txBody>
+                    <a:bodyPr/>
+                    <a:p>
+                      <a:pPr>
+                        <a:buNone/>
+                      </a:pPr>
+                      <a:endParaRPr lang="zh-CN" altLang="en-US" sz="1000"/>
+                    </a:p>
+                  </a:txBody>
+                  <a:tcPr>
+                    <a:solidFill>
+                      <a:schemeClr val="accent6">
+                        <a:lumMod val="20000"/>
+                        <a:lumOff val="80000"/>
+                        <a:alpha val="47000"/>
+                      </a:schemeClr>
+                    </a:solidFill>
+                  </a:tcPr>
+                </a:tc>
+              </a:tr>
+              <a:tr h="1173480">
+                <a:tc>
+                  <a:txBody>
+                    <a:bodyPr/>
+                    <a:p>
+                      <a:pPr algn="r">
+                        <a:buNone/>
+                      </a:pPr>
+                      <a:r>
+                        <a:rPr lang="de-DE" altLang="zh-CN" sz="2400">
+                          <a:latin typeface="Times New Roman" panose="02020603050405020304" charset="0"/>
+                        </a:rPr>
+                        <a:t>WiFi</a:t>
+                      </a:r>
+                      <a:endParaRPr lang="de-DE" altLang="zh-CN" sz="2400">
+                        <a:latin typeface="Times New Roman" panose="02020603050405020304" charset="0"/>
+                      </a:endParaRPr>
+                    </a:p>
+                  </a:txBody>
+                  <a:tcPr anchor="ctr" anchorCtr="0">
+                    <a:noFill/>
+                  </a:tcPr>
+                </a:tc>
+                <a:tc>
+                  <a:txBody>
+                    <a:bodyPr/>
+                    <a:p>
+                      <a:pPr>
+                        <a:buNone/>
+                      </a:pPr>
+                      <a:endParaRPr lang="zh-CN" altLang="en-US" sz="1000"/>
+                    </a:p>
+                  </a:txBody>
+                  <a:tcPr>
+                    <a:solidFill>
+                      <a:schemeClr val="accent5">
+                        <a:lumMod val="20000"/>
+                        <a:lumOff val="80000"/>
+                        <a:alpha val="18000"/>
+                      </a:schemeClr>
+                    </a:solidFill>
+                  </a:tcPr>
+                </a:tc>
+              </a:tr>
+              <a:tr h="1174750">
+                <a:tc>
+                  <a:txBody>
+                    <a:bodyPr/>
+                    <a:p>
+                      <a:pPr algn="r">
+                        <a:buNone/>
+                      </a:pPr>
+                      <a:r>
+                        <a:rPr lang="de-DE" sz="2400">
+                          <a:latin typeface="Times New Roman" panose="02020603050405020304" charset="0"/>
+                          <a:sym typeface="+mn-ea"/>
+                        </a:rPr>
+                        <a:t>Ultrasound</a:t>
+                      </a:r>
+                      <a:endParaRPr lang="de-DE" sz="2400">
+                        <a:latin typeface="Times New Roman" panose="02020603050405020304" charset="0"/>
+                        <a:sym typeface="+mn-ea"/>
+                      </a:endParaRPr>
+                    </a:p>
+                  </a:txBody>
+                  <a:tcPr anchor="ctr" anchorCtr="0">
+                    <a:noFill/>
+                  </a:tcPr>
+                </a:tc>
+                <a:tc>
+                  <a:txBody>
+                    <a:bodyPr/>
+                    <a:p>
+                      <a:pPr>
+                        <a:buNone/>
+                      </a:pPr>
+                      <a:endParaRPr lang="zh-CN" altLang="en-US" sz="6000"/>
+                    </a:p>
+                  </a:txBody>
+                  <a:tcPr>
+                    <a:solidFill>
+                      <a:schemeClr val="accent2">
+                        <a:lumMod val="20000"/>
+                        <a:lumOff val="80000"/>
+                        <a:alpha val="39000"/>
+                      </a:schemeClr>
+                    </a:solidFill>
+                  </a:tcPr>
+                </a:tc>
+              </a:tr>
+              <a:tr h="1172210">
+                <a:tc>
+                  <a:txBody>
+                    <a:bodyPr/>
+                    <a:p>
+                      <a:pPr algn="r">
+                        <a:buNone/>
+                      </a:pPr>
+                      <a:r>
+                        <a:rPr lang="de-DE" sz="2400">
+                          <a:latin typeface="Times New Roman" panose="02020603050405020304" charset="0"/>
+                          <a:sym typeface="+mn-ea"/>
+                        </a:rPr>
+                        <a:t>UWB</a:t>
+                      </a:r>
+                      <a:endParaRPr lang="de-DE" sz="2400">
+                        <a:latin typeface="Times New Roman" panose="02020603050405020304" charset="0"/>
+                        <a:sym typeface="+mn-ea"/>
+                      </a:endParaRPr>
+                    </a:p>
+                  </a:txBody>
+                  <a:tcPr anchor="ctr" anchorCtr="0">
+                    <a:noFill/>
+                  </a:tcPr>
+                </a:tc>
+                <a:tc>
+                  <a:txBody>
+                    <a:bodyPr/>
+                    <a:p>
+                      <a:pPr>
+                        <a:buNone/>
+                      </a:pPr>
+                      <a:endParaRPr lang="zh-CN" altLang="en-US" sz="6000"/>
+                    </a:p>
+                  </a:txBody>
+                  <a:tcPr>
+                    <a:solidFill>
+                      <a:schemeClr val="accent3">
+                        <a:lumMod val="20000"/>
+                        <a:lumOff val="80000"/>
+                        <a:alpha val="0"/>
+                      </a:schemeClr>
+                    </a:solidFill>
+                  </a:tcPr>
+                </a:tc>
+              </a:tr>
+            </a:tbl>
+          </a:graphicData>
+        </a:graphic>
+      </p:graphicFrame>
+      <p:sp>
+        <p:nvSpPr>
+          <p:cNvPr id="10" name="椭圆 9"/>
+          <p:cNvSpPr/>
+          <p:nvPr/>
+        </p:nvSpPr>
+        <p:spPr>
+          <a:xfrm>
+            <a:off x="2159635" y="6592570"/>
+            <a:ext cx="1718310" cy="1027430"/>
+          </a:xfrm>
+          <a:prstGeom prst="ellipse">
+            <a:avLst/>
+          </a:prstGeom>
+          <a:solidFill>
+            <a:schemeClr val="accent4">
+              <a:lumMod val="60000"/>
+              <a:lumOff val="40000"/>
+            </a:schemeClr>
+          </a:solidFill>
+        </p:spPr>
+        <p:style>
+          <a:lnRef idx="1">
+            <a:schemeClr val="accent2"/>
+          </a:lnRef>
+          <a:fillRef idx="2">
+            <a:schemeClr val="accent2"/>
+          </a:fillRef>
+          <a:effectRef idx="1">
+            <a:schemeClr val="accent2"/>
+          </a:effectRef>
+          <a:fontRef idx="minor">
+            <a:schemeClr val="dk1"/>
+          </a:fontRef>
+        </p:style>
+        <p:txBody>
+          <a:bodyPr rtlCol="0" anchor="ctr"/>
+          <a:p>
+            <a:pPr algn="ctr"/>
+            <a:r>
+              <a:rPr lang="de-DE" altLang="zh-CN" sz="1400"/>
+              <a:t>ArrayTrack[11]</a:t>
+            </a:r>
+            <a:endParaRPr lang="de-DE" altLang="zh-CN" sz="1400"/>
+          </a:p>
+          <a:p>
+            <a:pPr algn="ctr"/>
+            <a:r>
+              <a:rPr lang="de-DE" altLang="zh-CN" sz="1400"/>
+              <a:t>0.23 m</a:t>
+            </a:r>
+            <a:endParaRPr lang="de-DE" altLang="zh-CN" sz="1400"/>
+          </a:p>
+        </p:txBody>
+      </p:sp>
+      <p:sp>
+        <p:nvSpPr>
+          <p:cNvPr id="11" name="椭圆 10"/>
+          <p:cNvSpPr/>
+          <p:nvPr/>
+        </p:nvSpPr>
+        <p:spPr>
+          <a:xfrm>
+            <a:off x="11072495" y="6592570"/>
+            <a:ext cx="1608455" cy="1027430"/>
+          </a:xfrm>
+          <a:prstGeom prst="ellipse">
+            <a:avLst/>
+          </a:prstGeom>
+          <a:solidFill>
+            <a:schemeClr val="accent4">
+              <a:lumMod val="60000"/>
+              <a:lumOff val="40000"/>
+            </a:schemeClr>
+          </a:solidFill>
+        </p:spPr>
+        <p:style>
+          <a:lnRef idx="1">
+            <a:schemeClr val="accent2"/>
+          </a:lnRef>
+          <a:fillRef idx="2">
+            <a:schemeClr val="accent2"/>
+          </a:fillRef>
+          <a:effectRef idx="1">
+            <a:schemeClr val="accent2"/>
+          </a:effectRef>
+          <a:fontRef idx="minor">
+            <a:schemeClr val="dk1"/>
+          </a:fontRef>
+        </p:style>
+        <p:txBody>
+          <a:bodyPr rtlCol="0" anchor="ctr"/>
+          <a:p>
+            <a:pPr algn="ctr"/>
+            <a:r>
+              <a:rPr lang="de-DE" altLang="zh-CN" sz="1400"/>
+              <a:t>Ubicarse[11]</a:t>
+            </a:r>
+            <a:endParaRPr lang="de-DE" altLang="zh-CN" sz="1400"/>
+          </a:p>
+          <a:p>
+            <a:pPr algn="ctr"/>
+            <a:r>
+              <a:rPr lang="de-DE" altLang="zh-CN" sz="1400"/>
+              <a:t>0.39</a:t>
+            </a:r>
+            <a:endParaRPr lang="de-DE" altLang="zh-CN" sz="1400"/>
+          </a:p>
+        </p:txBody>
+      </p:sp>
+      <p:sp>
+        <p:nvSpPr>
+          <p:cNvPr id="8" name="椭圆 7"/>
+          <p:cNvSpPr/>
+          <p:nvPr/>
+        </p:nvSpPr>
+        <p:spPr>
+          <a:xfrm>
+            <a:off x="1197610" y="6488430"/>
+            <a:ext cx="962025" cy="1027430"/>
+          </a:xfrm>
+          <a:prstGeom prst="ellipse">
+            <a:avLst/>
+          </a:prstGeom>
+          <a:solidFill>
+            <a:schemeClr val="accent4">
+              <a:lumMod val="60000"/>
+              <a:lumOff val="40000"/>
+            </a:schemeClr>
+          </a:solidFill>
+        </p:spPr>
+        <p:style>
+          <a:lnRef idx="1">
+            <a:schemeClr val="accent2"/>
+          </a:lnRef>
+          <a:fillRef idx="2">
+            <a:schemeClr val="accent2"/>
+          </a:fillRef>
+          <a:effectRef idx="1">
+            <a:schemeClr val="accent2"/>
+          </a:effectRef>
+          <a:fontRef idx="minor">
+            <a:schemeClr val="dk1"/>
+          </a:fontRef>
+        </p:style>
+        <p:txBody>
+          <a:bodyPr rtlCol="0" anchor="ctr"/>
+          <a:p>
+            <a:pPr algn="ctr"/>
+            <a:r>
+              <a:rPr lang="de-DE" altLang="zh-CN">
+                <a:latin typeface="Times New Roman" panose="02020603050405020304" charset="0"/>
+              </a:rPr>
+              <a:t>[7], [8]</a:t>
+            </a:r>
+            <a:endParaRPr lang="de-DE" altLang="zh-CN">
+              <a:latin typeface="Times New Roman" panose="02020603050405020304" charset="0"/>
+            </a:endParaRPr>
+          </a:p>
+          <a:p>
+            <a:pPr algn="ctr"/>
+            <a:r>
+              <a:rPr lang="de-DE" altLang="zh-CN">
+                <a:latin typeface="Times New Roman" panose="02020603050405020304" charset="0"/>
+              </a:rPr>
+              <a:t>0.1 m</a:t>
+            </a:r>
+            <a:endParaRPr lang="de-DE" altLang="zh-CN">
+              <a:latin typeface="Times New Roman" panose="02020603050405020304" charset="0"/>
+            </a:endParaRPr>
+          </a:p>
+        </p:txBody>
+      </p:sp>
+      <p:sp>
+        <p:nvSpPr>
+          <p:cNvPr id="2" name="椭圆 1"/>
+          <p:cNvSpPr/>
+          <p:nvPr/>
+        </p:nvSpPr>
+        <p:spPr>
+          <a:xfrm>
+            <a:off x="9727565" y="6395085"/>
+            <a:ext cx="1267460" cy="1027430"/>
+          </a:xfrm>
+          <a:prstGeom prst="ellipse">
+            <a:avLst/>
+          </a:prstGeom>
+          <a:solidFill>
+            <a:schemeClr val="accent4">
+              <a:lumMod val="60000"/>
+              <a:lumOff val="40000"/>
+            </a:schemeClr>
+          </a:solidFill>
+        </p:spPr>
+        <p:style>
+          <a:lnRef idx="1">
+            <a:schemeClr val="accent2"/>
+          </a:lnRef>
+          <a:fillRef idx="2">
+            <a:schemeClr val="accent2"/>
+          </a:fillRef>
+          <a:effectRef idx="1">
+            <a:schemeClr val="accent2"/>
+          </a:effectRef>
+          <a:fontRef idx="minor">
+            <a:schemeClr val="dk1"/>
+          </a:fontRef>
+        </p:style>
+        <p:txBody>
+          <a:bodyPr rtlCol="0" anchor="ctr"/>
+          <a:p>
+            <a:pPr algn="ctr">
+              <a:buNone/>
+            </a:pPr>
+            <a:r>
+              <a:rPr lang="de-DE" altLang="zh-CN" sz="1400">
+                <a:latin typeface="Times New Roman" panose="02020603050405020304" charset="0"/>
+              </a:rPr>
+              <a:t>EKF-LWCR</a:t>
+            </a:r>
+            <a:endParaRPr lang="de-DE" altLang="zh-CN" sz="1400">
+              <a:latin typeface="Times New Roman" panose="02020603050405020304" charset="0"/>
+            </a:endParaRPr>
+          </a:p>
+          <a:p>
+            <a:pPr algn="ctr">
+              <a:buNone/>
+            </a:pPr>
+            <a:r>
+              <a:rPr lang="de-DE" altLang="zh-CN" sz="1400" i="1">
+                <a:latin typeface="Times New Roman" panose="02020603050405020304" charset="0"/>
+              </a:rPr>
+              <a:t>0.20 m</a:t>
+            </a:r>
+            <a:endParaRPr lang="de-DE" altLang="zh-CN" sz="1400" i="1">
+              <a:latin typeface="Times New Roman" panose="02020603050405020304" charset="0"/>
+            </a:endParaRPr>
+          </a:p>
+        </p:txBody>
+      </p:sp>
+      <p:sp>
+        <p:nvSpPr>
+          <p:cNvPr id="5" name="椭圆 4"/>
+          <p:cNvSpPr/>
+          <p:nvPr/>
+        </p:nvSpPr>
+        <p:spPr>
+          <a:xfrm>
+            <a:off x="3565525" y="6488430"/>
+            <a:ext cx="1191260" cy="1027430"/>
+          </a:xfrm>
+          <a:prstGeom prst="ellipse">
+            <a:avLst/>
+          </a:prstGeom>
+          <a:solidFill>
+            <a:schemeClr val="accent4">
+              <a:lumMod val="60000"/>
+              <a:lumOff val="40000"/>
+            </a:schemeClr>
+          </a:solidFill>
+        </p:spPr>
+        <p:style>
+          <a:lnRef idx="1">
+            <a:schemeClr val="accent2"/>
+          </a:lnRef>
+          <a:fillRef idx="2">
+            <a:schemeClr val="accent2"/>
+          </a:fillRef>
+          <a:effectRef idx="1">
+            <a:schemeClr val="accent2"/>
+          </a:effectRef>
+          <a:fontRef idx="minor">
+            <a:schemeClr val="dk1"/>
+          </a:fontRef>
+        </p:style>
+        <p:txBody>
+          <a:bodyPr rtlCol="0" anchor="ctr"/>
+          <a:p>
+            <a:pPr algn="ctr">
+              <a:buNone/>
+            </a:pPr>
+            <a:r>
+              <a:rPr lang="de-DE" altLang="zh-CN" sz="900">
+                <a:latin typeface="Times New Roman" panose="02020603050405020304" charset="0"/>
+              </a:rPr>
+              <a:t>OM</a:t>
+            </a:r>
+            <a:endParaRPr lang="de-DE" altLang="zh-CN" sz="900">
+              <a:latin typeface="Times New Roman" panose="02020603050405020304" charset="0"/>
+            </a:endParaRPr>
+          </a:p>
+          <a:p>
+            <a:pPr algn="ctr">
+              <a:buNone/>
+            </a:pPr>
+            <a:r>
+              <a:rPr lang="de-DE" altLang="zh-CN" sz="900">
+                <a:latin typeface="Times New Roman" panose="02020603050405020304" charset="0"/>
+              </a:rPr>
+              <a:t>0.21 m</a:t>
+            </a:r>
+            <a:endParaRPr lang="de-DE" altLang="zh-CN" sz="900">
+              <a:latin typeface="Times New Roman" panose="02020603050405020304" charset="0"/>
+            </a:endParaRPr>
+          </a:p>
+        </p:txBody>
+      </p:sp>
+      <p:sp>
+        <p:nvSpPr>
+          <p:cNvPr id="6" name="椭圆 5"/>
+          <p:cNvSpPr/>
+          <p:nvPr/>
+        </p:nvSpPr>
+        <p:spPr>
+          <a:xfrm>
+            <a:off x="6043930" y="6592570"/>
+            <a:ext cx="1267460" cy="1027430"/>
+          </a:xfrm>
+          <a:prstGeom prst="ellipse">
+            <a:avLst/>
+          </a:prstGeom>
+          <a:solidFill>
+            <a:schemeClr val="accent4">
+              <a:lumMod val="60000"/>
+              <a:lumOff val="40000"/>
+            </a:schemeClr>
+          </a:solidFill>
+        </p:spPr>
+        <p:style>
+          <a:lnRef idx="1">
+            <a:schemeClr val="accent2"/>
+          </a:lnRef>
+          <a:fillRef idx="2">
+            <a:schemeClr val="accent2"/>
+          </a:fillRef>
+          <a:effectRef idx="1">
+            <a:schemeClr val="accent2"/>
+          </a:effectRef>
+          <a:fontRef idx="minor">
+            <a:schemeClr val="dk1"/>
+          </a:fontRef>
+        </p:style>
+        <p:txBody>
+          <a:bodyPr rtlCol="0" anchor="ctr"/>
+          <a:p>
+            <a:pPr algn="ctr">
+              <a:buNone/>
+            </a:pPr>
+            <a:r>
+              <a:rPr lang="de-DE" altLang="zh-CN" sz="1000">
+                <a:latin typeface="Times New Roman" panose="02020603050405020304" charset="0"/>
+              </a:rPr>
+              <a:t>EKF-MC1</a:t>
+            </a:r>
+            <a:endParaRPr lang="de-DE" altLang="zh-CN" sz="1000">
+              <a:latin typeface="Times New Roman" panose="02020603050405020304" charset="0"/>
+            </a:endParaRPr>
+          </a:p>
+          <a:p>
+            <a:pPr algn="ctr">
+              <a:buNone/>
+            </a:pPr>
+            <a:r>
+              <a:rPr lang="de-DE" altLang="zh-CN" sz="1000">
+                <a:latin typeface="Times New Roman" panose="02020603050405020304" charset="0"/>
+              </a:rPr>
+              <a:t>0.22 m</a:t>
+            </a:r>
+            <a:endParaRPr lang="de-DE" altLang="zh-CN" sz="1000">
+              <a:latin typeface="Times New Roman" panose="02020603050405020304" charset="0"/>
+            </a:endParaRPr>
+          </a:p>
+        </p:txBody>
+      </p:sp>
+      <p:sp>
+        <p:nvSpPr>
+          <p:cNvPr id="7" name="椭圆 6"/>
+          <p:cNvSpPr/>
+          <p:nvPr/>
+        </p:nvSpPr>
+        <p:spPr>
+          <a:xfrm>
+            <a:off x="8159115" y="6318250"/>
+            <a:ext cx="1334770" cy="1027430"/>
+          </a:xfrm>
+          <a:prstGeom prst="ellipse">
+            <a:avLst/>
+          </a:prstGeom>
+          <a:solidFill>
+            <a:schemeClr val="accent4">
+              <a:lumMod val="60000"/>
+              <a:lumOff val="40000"/>
+            </a:schemeClr>
+          </a:solidFill>
+        </p:spPr>
+        <p:style>
+          <a:lnRef idx="1">
+            <a:schemeClr val="accent2"/>
+          </a:lnRef>
+          <a:fillRef idx="2">
+            <a:schemeClr val="accent2"/>
+          </a:fillRef>
+          <a:effectRef idx="1">
+            <a:schemeClr val="accent2"/>
+          </a:effectRef>
+          <a:fontRef idx="minor">
+            <a:schemeClr val="dk1"/>
+          </a:fontRef>
+        </p:style>
+        <p:txBody>
+          <a:bodyPr rtlCol="0" anchor="ctr"/>
+          <a:p>
+            <a:pPr algn="ctr">
+              <a:buNone/>
+            </a:pPr>
+            <a:r>
+              <a:rPr lang="de-DE" altLang="zh-CN" sz="1200">
+                <a:latin typeface="Times New Roman" panose="02020603050405020304" charset="0"/>
+              </a:rPr>
+              <a:t>EKF-MC2</a:t>
+            </a:r>
+            <a:endParaRPr lang="de-DE" altLang="zh-CN" sz="1200">
+              <a:latin typeface="Times New Roman" panose="02020603050405020304" charset="0"/>
+            </a:endParaRPr>
+          </a:p>
+          <a:p>
+            <a:pPr algn="ctr">
+              <a:buNone/>
+            </a:pPr>
+            <a:r>
+              <a:rPr lang="de-DE" altLang="zh-CN" sz="1200">
+                <a:latin typeface="Times New Roman" panose="02020603050405020304" charset="0"/>
+              </a:rPr>
+              <a:t>0.25 m</a:t>
+            </a:r>
+            <a:endParaRPr lang="de-DE" altLang="zh-CN" sz="1200">
+              <a:latin typeface="Times New Roman" panose="02020603050405020304" charset="0"/>
+            </a:endParaRPr>
+          </a:p>
+        </p:txBody>
+      </p:sp>
+      <p:sp>
+        <p:nvSpPr>
+          <p:cNvPr id="9" name="椭圆 8"/>
+          <p:cNvSpPr/>
+          <p:nvPr/>
+        </p:nvSpPr>
+        <p:spPr>
+          <a:xfrm>
+            <a:off x="4478020" y="6592570"/>
+            <a:ext cx="1722120" cy="1027430"/>
+          </a:xfrm>
+          <a:prstGeom prst="ellipse">
+            <a:avLst/>
+          </a:prstGeom>
+          <a:solidFill>
+            <a:schemeClr val="accent4">
+              <a:lumMod val="60000"/>
+              <a:lumOff val="40000"/>
+            </a:schemeClr>
+          </a:solidFill>
+        </p:spPr>
+        <p:style>
+          <a:lnRef idx="1">
+            <a:schemeClr val="accent2"/>
+          </a:lnRef>
+          <a:fillRef idx="2">
+            <a:schemeClr val="accent2"/>
+          </a:fillRef>
+          <a:effectRef idx="1">
+            <a:schemeClr val="accent2"/>
+          </a:effectRef>
+          <a:fontRef idx="minor">
+            <a:schemeClr val="dk1"/>
+          </a:fontRef>
+        </p:style>
+        <p:txBody>
+          <a:bodyPr rtlCol="0" anchor="ctr"/>
+          <a:p>
+            <a:pPr algn="ctr">
+              <a:buNone/>
+            </a:pPr>
+            <a:r>
+              <a:rPr lang="de-DE" altLang="zh-CN" sz="1600">
+                <a:latin typeface="Times New Roman" panose="02020603050405020304" charset="0"/>
+              </a:rPr>
+              <a:t>ASSIST [11]</a:t>
+            </a:r>
+            <a:endParaRPr lang="de-DE" altLang="zh-CN" sz="1600">
+              <a:latin typeface="Times New Roman" panose="02020603050405020304" charset="0"/>
+            </a:endParaRPr>
+          </a:p>
+          <a:p>
+            <a:pPr algn="ctr">
+              <a:buNone/>
+            </a:pPr>
+            <a:r>
+              <a:rPr lang="de-DE" altLang="zh-CN" sz="1600">
+                <a:latin typeface="Times New Roman" panose="02020603050405020304" charset="0"/>
+              </a:rPr>
+              <a:t>0.29 m</a:t>
+            </a:r>
+            <a:endParaRPr lang="de-DE" altLang="zh-CN" sz="1600">
+              <a:latin typeface="Times New Roman" panose="02020603050405020304" charset="0"/>
+            </a:endParaRPr>
+          </a:p>
+        </p:txBody>
+      </p:sp>
+      <p:sp>
+        <p:nvSpPr>
+          <p:cNvPr id="13" name="椭圆 12"/>
+          <p:cNvSpPr/>
+          <p:nvPr/>
+        </p:nvSpPr>
+        <p:spPr>
+          <a:xfrm>
+            <a:off x="7311390" y="6318250"/>
+            <a:ext cx="836930" cy="1027430"/>
+          </a:xfrm>
+          <a:prstGeom prst="ellipse">
+            <a:avLst/>
+          </a:prstGeom>
+          <a:solidFill>
+            <a:schemeClr val="accent4">
+              <a:lumMod val="60000"/>
+              <a:lumOff val="40000"/>
+            </a:schemeClr>
+          </a:solidFill>
+        </p:spPr>
+        <p:style>
+          <a:lnRef idx="1">
+            <a:schemeClr val="accent2"/>
+          </a:lnRef>
+          <a:fillRef idx="2">
+            <a:schemeClr val="accent2"/>
+          </a:fillRef>
+          <a:effectRef idx="1">
+            <a:schemeClr val="accent2"/>
+          </a:effectRef>
+          <a:fontRef idx="minor">
+            <a:schemeClr val="dk1"/>
+          </a:fontRef>
+        </p:style>
+        <p:txBody>
+          <a:bodyPr rtlCol="0" anchor="ctr"/>
+          <a:p>
+            <a:pPr algn="ctr">
+              <a:buNone/>
+            </a:pPr>
+            <a:r>
+              <a:rPr lang="de-DE" altLang="zh-CN" sz="1400">
+                <a:latin typeface="Times New Roman" panose="02020603050405020304" charset="0"/>
+              </a:rPr>
+              <a:t>[3]</a:t>
+            </a:r>
+            <a:endParaRPr lang="de-DE" altLang="zh-CN" sz="1400">
+              <a:latin typeface="Times New Roman" panose="02020603050405020304" charset="0"/>
+            </a:endParaRPr>
+          </a:p>
+          <a:p>
+            <a:pPr algn="ctr">
+              <a:buNone/>
+            </a:pPr>
+            <a:r>
+              <a:rPr lang="de-DE" altLang="zh-CN" sz="1400">
+                <a:latin typeface="Times New Roman" panose="02020603050405020304" charset="0"/>
+              </a:rPr>
+              <a:t>1.9 m</a:t>
+            </a:r>
+            <a:endParaRPr lang="de-DE" altLang="zh-CN" sz="1400"/>
+          </a:p>
+        </p:txBody>
+      </p:sp>
+      <p:sp>
+        <p:nvSpPr>
+          <p:cNvPr id="12" name="椭圆 11"/>
+          <p:cNvSpPr/>
+          <p:nvPr/>
+        </p:nvSpPr>
+        <p:spPr>
+          <a:xfrm>
+            <a:off x="10672445" y="6214110"/>
+            <a:ext cx="865505" cy="1027430"/>
+          </a:xfrm>
+          <a:prstGeom prst="ellipse">
+            <a:avLst/>
+          </a:prstGeom>
+          <a:solidFill>
+            <a:schemeClr val="accent4">
+              <a:lumMod val="60000"/>
+              <a:lumOff val="40000"/>
+            </a:schemeClr>
+          </a:solidFill>
+        </p:spPr>
+        <p:style>
+          <a:lnRef idx="1">
+            <a:schemeClr val="accent2"/>
+          </a:lnRef>
+          <a:fillRef idx="2">
+            <a:schemeClr val="accent2"/>
+          </a:fillRef>
+          <a:effectRef idx="1">
+            <a:schemeClr val="accent2"/>
+          </a:effectRef>
+          <a:fontRef idx="minor">
+            <a:schemeClr val="dk1"/>
+          </a:fontRef>
+        </p:style>
+        <p:txBody>
+          <a:bodyPr rtlCol="0" anchor="ctr"/>
+          <a:p>
+            <a:pPr algn="ctr">
+              <a:buNone/>
+            </a:pPr>
+            <a:r>
+              <a:rPr lang="de-DE" altLang="zh-CN" sz="1400">
+                <a:latin typeface="Times New Roman" panose="02020603050405020304" charset="0"/>
+              </a:rPr>
+              <a:t>[2]</a:t>
+            </a:r>
+            <a:endParaRPr lang="de-DE" altLang="zh-CN" sz="1400">
+              <a:latin typeface="Times New Roman" panose="02020603050405020304" charset="0"/>
+            </a:endParaRPr>
+          </a:p>
+          <a:p>
+            <a:pPr algn="ctr">
+              <a:buNone/>
+            </a:pPr>
+            <a:r>
+              <a:rPr lang="de-DE" altLang="zh-CN" sz="1400">
+                <a:latin typeface="Times New Roman" panose="02020603050405020304" charset="0"/>
+              </a:rPr>
+              <a:t>4.9 m</a:t>
+            </a:r>
+            <a:endParaRPr lang="de-DE" altLang="zh-CN" sz="1400">
+              <a:latin typeface="Times New Roman" panose="02020603050405020304" charset="0"/>
+            </a:endParaRPr>
+          </a:p>
+        </p:txBody>
+      </p:sp>
+      <p:sp>
+        <p:nvSpPr>
+          <p:cNvPr id="16" name="文本框 15"/>
+          <p:cNvSpPr txBox="1"/>
+          <p:nvPr/>
+        </p:nvSpPr>
+        <p:spPr>
+          <a:xfrm>
+            <a:off x="4012565" y="4078605"/>
+            <a:ext cx="296545" cy="521970"/>
+          </a:xfrm>
+          <a:prstGeom prst="rect">
+            <a:avLst/>
+          </a:prstGeom>
+          <a:noFill/>
+        </p:spPr>
+        <p:txBody>
+          <a:bodyPr wrap="square" rtlCol="0">
+            <a:spAutoFit/>
+          </a:bodyPr>
+          <a:p>
+            <a:r>
+              <a:rPr lang="de-DE" altLang="zh-CN" sz="2800" b="1"/>
+              <a:t>*</a:t>
+            </a:r>
+            <a:endParaRPr lang="de-DE" altLang="zh-CN"/>
+          </a:p>
+        </p:txBody>
+      </p:sp>
+      <p:sp>
+        <p:nvSpPr>
+          <p:cNvPr id="17" name="文本框 16"/>
+          <p:cNvSpPr txBox="1"/>
+          <p:nvPr/>
+        </p:nvSpPr>
+        <p:spPr>
+          <a:xfrm>
+            <a:off x="4140200" y="4347210"/>
+            <a:ext cx="296545" cy="521970"/>
+          </a:xfrm>
+          <a:prstGeom prst="rect">
+            <a:avLst/>
+          </a:prstGeom>
+          <a:noFill/>
+        </p:spPr>
+        <p:txBody>
+          <a:bodyPr wrap="square" rtlCol="0">
+            <a:spAutoFit/>
+          </a:bodyPr>
+          <a:p>
+            <a:pPr lvl="0" algn="l"/>
+            <a:r>
+              <a:rPr lang="de-DE" altLang="zh-CN" sz="2800" b="1">
+                <a:sym typeface="+mn-ea"/>
+              </a:rPr>
+              <a:t>*</a:t>
+            </a:r>
+            <a:endParaRPr lang="de-DE" altLang="zh-CN" sz="2800" b="1">
+              <a:sym typeface="+mn-ea"/>
+            </a:endParaRPr>
+          </a:p>
+        </p:txBody>
+      </p:sp>
+      <p:sp>
+        <p:nvSpPr>
+          <p:cNvPr id="18" name="文本框 17"/>
+          <p:cNvSpPr txBox="1"/>
+          <p:nvPr/>
+        </p:nvSpPr>
+        <p:spPr>
+          <a:xfrm>
+            <a:off x="4267200" y="4676140"/>
+            <a:ext cx="296545" cy="521970"/>
+          </a:xfrm>
+          <a:prstGeom prst="rect">
+            <a:avLst/>
+          </a:prstGeom>
+          <a:noFill/>
+        </p:spPr>
+        <p:txBody>
+          <a:bodyPr wrap="square" rtlCol="0">
+            <a:spAutoFit/>
+          </a:bodyPr>
+          <a:p>
+            <a:pPr lvl="0" algn="l"/>
+            <a:r>
+              <a:rPr lang="de-DE" altLang="zh-CN" sz="2800" b="1">
+                <a:sym typeface="+mn-ea"/>
+              </a:rPr>
+              <a:t>*</a:t>
+            </a:r>
+            <a:endParaRPr lang="de-DE" altLang="zh-CN" sz="2800" b="1">
+              <a:sym typeface="+mn-ea"/>
+            </a:endParaRPr>
+          </a:p>
+        </p:txBody>
+      </p:sp>
+      <p:sp>
+        <p:nvSpPr>
+          <p:cNvPr id="19" name="文本框 18"/>
+          <p:cNvSpPr txBox="1"/>
+          <p:nvPr/>
+        </p:nvSpPr>
+        <p:spPr>
+          <a:xfrm>
+            <a:off x="4478020" y="4949825"/>
+            <a:ext cx="296545" cy="521970"/>
+          </a:xfrm>
+          <a:prstGeom prst="rect">
+            <a:avLst/>
+          </a:prstGeom>
+          <a:noFill/>
+        </p:spPr>
+        <p:txBody>
+          <a:bodyPr wrap="square" rtlCol="0">
+            <a:spAutoFit/>
+          </a:bodyPr>
+          <a:p>
+            <a:pPr lvl="0" algn="l"/>
+            <a:r>
+              <a:rPr lang="de-DE" altLang="zh-CN" sz="2800" b="1">
+                <a:sym typeface="+mn-ea"/>
+              </a:rPr>
+              <a:t>*</a:t>
+            </a:r>
+            <a:endParaRPr lang="de-DE" altLang="zh-CN" sz="2800" b="1">
+              <a:sym typeface="+mn-ea"/>
+            </a:endParaRPr>
+          </a:p>
+        </p:txBody>
+      </p:sp>
+      <p:sp>
+        <p:nvSpPr>
+          <p:cNvPr id="21" name="文本框 20"/>
+          <p:cNvSpPr txBox="1"/>
+          <p:nvPr/>
+        </p:nvSpPr>
+        <p:spPr>
+          <a:xfrm>
+            <a:off x="2428875" y="2870200"/>
+            <a:ext cx="296545" cy="521970"/>
+          </a:xfrm>
+          <a:prstGeom prst="rect">
+            <a:avLst/>
+          </a:prstGeom>
+          <a:noFill/>
+        </p:spPr>
+        <p:txBody>
+          <a:bodyPr wrap="square" rtlCol="0">
+            <a:spAutoFit/>
+          </a:bodyPr>
+          <a:p>
+            <a:r>
+              <a:rPr lang="de-DE" altLang="zh-CN" sz="2800" b="1"/>
+              <a:t>*</a:t>
+            </a:r>
+            <a:endParaRPr lang="de-DE" altLang="zh-CN" sz="2800" b="1"/>
+          </a:p>
+        </p:txBody>
+      </p:sp>
+      <p:sp>
+        <p:nvSpPr>
+          <p:cNvPr id="22" name="文本框 21"/>
+          <p:cNvSpPr txBox="1"/>
+          <p:nvPr/>
+        </p:nvSpPr>
+        <p:spPr>
+          <a:xfrm>
+            <a:off x="4836160" y="2869565"/>
+            <a:ext cx="296545" cy="521970"/>
+          </a:xfrm>
+          <a:prstGeom prst="rect">
+            <a:avLst/>
+          </a:prstGeom>
+          <a:noFill/>
+        </p:spPr>
+        <p:txBody>
+          <a:bodyPr wrap="square" rtlCol="0">
+            <a:spAutoFit/>
+          </a:bodyPr>
+          <a:p>
+            <a:pPr lvl="0" algn="l"/>
+            <a:r>
+              <a:rPr lang="de-DE" altLang="zh-CN" sz="2800" b="1">
+                <a:sym typeface="+mn-ea"/>
+              </a:rPr>
+              <a:t>*</a:t>
+            </a:r>
+            <a:endParaRPr lang="de-DE" altLang="zh-CN" sz="2800" b="1">
+              <a:sym typeface="+mn-ea"/>
+            </a:endParaRPr>
+          </a:p>
+        </p:txBody>
+      </p:sp>
+      <p:sp>
+        <p:nvSpPr>
+          <p:cNvPr id="23" name="文本框 22"/>
+          <p:cNvSpPr txBox="1"/>
+          <p:nvPr/>
+        </p:nvSpPr>
+        <p:spPr>
+          <a:xfrm>
+            <a:off x="5563870" y="2167890"/>
+            <a:ext cx="296545" cy="521970"/>
+          </a:xfrm>
+          <a:prstGeom prst="rect">
+            <a:avLst/>
+          </a:prstGeom>
+          <a:noFill/>
+        </p:spPr>
+        <p:txBody>
+          <a:bodyPr wrap="square" rtlCol="0">
+            <a:spAutoFit/>
+          </a:bodyPr>
+          <a:p>
+            <a:pPr lvl="0" algn="l"/>
+            <a:r>
+              <a:rPr lang="de-DE" altLang="zh-CN" sz="2800" b="1">
+                <a:sym typeface="+mn-ea"/>
+              </a:rPr>
+              <a:t>*</a:t>
+            </a:r>
+            <a:endParaRPr lang="de-DE" altLang="zh-CN" sz="2800" b="1">
+              <a:sym typeface="+mn-ea"/>
+            </a:endParaRPr>
+          </a:p>
+        </p:txBody>
+      </p:sp>
+      <p:sp>
+        <p:nvSpPr>
+          <p:cNvPr id="24" name="文本框 23"/>
+          <p:cNvSpPr txBox="1"/>
+          <p:nvPr/>
+        </p:nvSpPr>
+        <p:spPr>
+          <a:xfrm>
+            <a:off x="4400550" y="2161540"/>
+            <a:ext cx="296545" cy="521970"/>
+          </a:xfrm>
+          <a:prstGeom prst="rect">
+            <a:avLst/>
+          </a:prstGeom>
+          <a:noFill/>
+        </p:spPr>
+        <p:txBody>
+          <a:bodyPr wrap="square" rtlCol="0">
+            <a:spAutoFit/>
+          </a:bodyPr>
+          <a:p>
+            <a:pPr lvl="0" algn="l"/>
+            <a:r>
+              <a:rPr lang="de-DE" altLang="zh-CN" sz="2800" b="1">
+                <a:sym typeface="+mn-ea"/>
+              </a:rPr>
+              <a:t>*</a:t>
+            </a:r>
+            <a:endParaRPr lang="de-DE" altLang="zh-CN" sz="2800" b="1">
+              <a:sym typeface="+mn-ea"/>
+            </a:endParaRPr>
+          </a:p>
+        </p:txBody>
+      </p:sp>
+      <p:sp>
+        <p:nvSpPr>
+          <p:cNvPr id="25" name="文本框 24"/>
+          <p:cNvSpPr txBox="1"/>
+          <p:nvPr/>
+        </p:nvSpPr>
+        <p:spPr>
+          <a:xfrm>
+            <a:off x="9063355" y="1342390"/>
+            <a:ext cx="296545" cy="521970"/>
+          </a:xfrm>
+          <a:prstGeom prst="rect">
+            <a:avLst/>
+          </a:prstGeom>
+          <a:noFill/>
+        </p:spPr>
+        <p:txBody>
+          <a:bodyPr wrap="square" rtlCol="0">
+            <a:spAutoFit/>
+          </a:bodyPr>
+          <a:p>
+            <a:pPr lvl="0" algn="l"/>
+            <a:r>
+              <a:rPr lang="de-DE" altLang="zh-CN" sz="2800" b="1">
+                <a:sym typeface="+mn-ea"/>
+              </a:rPr>
+              <a:t>*</a:t>
+            </a:r>
+            <a:endParaRPr lang="de-DE" altLang="zh-CN" sz="2800" b="1">
+              <a:sym typeface="+mn-ea"/>
+            </a:endParaRPr>
+          </a:p>
+        </p:txBody>
+      </p:sp>
+      <p:sp>
+        <p:nvSpPr>
+          <p:cNvPr id="26" name="文本框 25"/>
+          <p:cNvSpPr txBox="1"/>
+          <p:nvPr/>
+        </p:nvSpPr>
+        <p:spPr>
+          <a:xfrm>
+            <a:off x="11224895" y="1334135"/>
+            <a:ext cx="296545" cy="521970"/>
+          </a:xfrm>
+          <a:prstGeom prst="rect">
+            <a:avLst/>
+          </a:prstGeom>
+          <a:noFill/>
+        </p:spPr>
+        <p:txBody>
+          <a:bodyPr wrap="square" rtlCol="0">
+            <a:spAutoFit/>
+          </a:bodyPr>
+          <a:p>
+            <a:pPr lvl="0" algn="l"/>
+            <a:r>
+              <a:rPr lang="de-DE" altLang="zh-CN" sz="2800" b="1">
+                <a:sym typeface="+mn-ea"/>
+              </a:rPr>
+              <a:t>*</a:t>
+            </a:r>
+            <a:endParaRPr lang="de-DE" altLang="zh-CN" sz="2800" b="1">
+              <a:sym typeface="+mn-ea"/>
+            </a:endParaRPr>
+          </a:p>
+        </p:txBody>
+      </p:sp>
+      <p:sp>
+        <p:nvSpPr>
+          <p:cNvPr id="27" name="文本框 26"/>
+          <p:cNvSpPr txBox="1"/>
+          <p:nvPr/>
+        </p:nvSpPr>
+        <p:spPr>
+          <a:xfrm>
+            <a:off x="4309745" y="4075430"/>
+            <a:ext cx="3392170" cy="368300"/>
+          </a:xfrm>
+          <a:prstGeom prst="rect">
+            <a:avLst/>
+          </a:prstGeom>
+          <a:noFill/>
+        </p:spPr>
+        <p:txBody>
+          <a:bodyPr wrap="square" rtlCol="0">
+            <a:spAutoFit/>
+          </a:bodyPr>
+          <a:p>
+            <a:pPr algn="l">
+              <a:buNone/>
+            </a:pPr>
+            <a:r>
+              <a:rPr lang="de-DE" altLang="zh-CN">
+                <a:solidFill>
+                  <a:schemeClr val="dk1"/>
+                </a:solidFill>
+                <a:latin typeface="Times New Roman" panose="02020603050405020304" charset="0"/>
+                <a:sym typeface="+mn-ea"/>
+              </a:rPr>
+              <a:t>EKF-LWCR: 20 cm</a:t>
+            </a:r>
+            <a:endParaRPr lang="de-DE" altLang="zh-CN" sz="1600">
+              <a:solidFill>
+                <a:schemeClr val="dk1"/>
+              </a:solidFill>
+              <a:latin typeface="Times New Roman" panose="02020603050405020304" charset="0"/>
+              <a:sym typeface="+mn-ea"/>
+            </a:endParaRPr>
+          </a:p>
+        </p:txBody>
+      </p:sp>
+      <p:sp>
+        <p:nvSpPr>
+          <p:cNvPr id="28" name="文本框 27"/>
+          <p:cNvSpPr txBox="1"/>
+          <p:nvPr/>
+        </p:nvSpPr>
+        <p:spPr>
+          <a:xfrm>
+            <a:off x="4436745" y="4360545"/>
+            <a:ext cx="3392170" cy="368300"/>
+          </a:xfrm>
+          <a:prstGeom prst="rect">
+            <a:avLst/>
+          </a:prstGeom>
+          <a:noFill/>
+        </p:spPr>
+        <p:txBody>
+          <a:bodyPr wrap="square" rtlCol="0">
+            <a:spAutoFit/>
+          </a:bodyPr>
+          <a:p>
+            <a:pPr algn="l">
+              <a:buNone/>
+            </a:pPr>
+            <a:r>
+              <a:rPr lang="de-DE" altLang="zh-CN">
+                <a:solidFill>
+                  <a:schemeClr val="dk1"/>
+                </a:solidFill>
+                <a:latin typeface="Times New Roman" panose="02020603050405020304" charset="0"/>
+                <a:sym typeface="+mn-ea"/>
+              </a:rPr>
+              <a:t>OM: 21 cm</a:t>
+            </a:r>
+            <a:endParaRPr lang="de-DE" altLang="zh-CN" sz="1600">
+              <a:solidFill>
+                <a:schemeClr val="dk1"/>
+              </a:solidFill>
+              <a:latin typeface="Times New Roman" panose="02020603050405020304" charset="0"/>
+              <a:sym typeface="+mn-ea"/>
+            </a:endParaRPr>
+          </a:p>
+        </p:txBody>
+      </p:sp>
+      <p:sp>
+        <p:nvSpPr>
+          <p:cNvPr id="29" name="文本框 28"/>
+          <p:cNvSpPr txBox="1"/>
+          <p:nvPr/>
+        </p:nvSpPr>
+        <p:spPr>
+          <a:xfrm>
+            <a:off x="4577080" y="4681220"/>
+            <a:ext cx="3392170" cy="368300"/>
+          </a:xfrm>
+          <a:prstGeom prst="rect">
+            <a:avLst/>
+          </a:prstGeom>
+          <a:noFill/>
+        </p:spPr>
+        <p:txBody>
+          <a:bodyPr wrap="square" rtlCol="0">
+            <a:spAutoFit/>
+          </a:bodyPr>
+          <a:p>
+            <a:pPr algn="l">
+              <a:buNone/>
+            </a:pPr>
+            <a:r>
+              <a:rPr lang="de-DE" altLang="zh-CN">
+                <a:solidFill>
+                  <a:schemeClr val="dk1"/>
+                </a:solidFill>
+                <a:latin typeface="Times New Roman" panose="02020603050405020304" charset="0"/>
+                <a:sym typeface="+mn-ea"/>
+              </a:rPr>
+              <a:t>EKF-MC1: 22 cm</a:t>
+            </a:r>
+            <a:endParaRPr lang="de-DE" altLang="zh-CN" sz="1600">
+              <a:solidFill>
+                <a:schemeClr val="dk1"/>
+              </a:solidFill>
+              <a:latin typeface="Times New Roman" panose="02020603050405020304" charset="0"/>
+              <a:sym typeface="+mn-ea"/>
+            </a:endParaRPr>
+          </a:p>
+        </p:txBody>
+      </p:sp>
+      <p:sp>
+        <p:nvSpPr>
+          <p:cNvPr id="30" name="文本框 29"/>
+          <p:cNvSpPr txBox="1"/>
+          <p:nvPr/>
+        </p:nvSpPr>
+        <p:spPr>
+          <a:xfrm>
+            <a:off x="4764405" y="4975225"/>
+            <a:ext cx="3392170" cy="368300"/>
+          </a:xfrm>
+          <a:prstGeom prst="rect">
+            <a:avLst/>
+          </a:prstGeom>
+          <a:noFill/>
+        </p:spPr>
+        <p:txBody>
+          <a:bodyPr wrap="square" rtlCol="0">
+            <a:spAutoFit/>
+          </a:bodyPr>
+          <a:p>
+            <a:pPr algn="l">
+              <a:buNone/>
+            </a:pPr>
+            <a:r>
+              <a:rPr lang="de-DE" altLang="zh-CN">
+                <a:solidFill>
+                  <a:schemeClr val="dk1"/>
+                </a:solidFill>
+                <a:latin typeface="Times New Roman" panose="02020603050405020304" charset="0"/>
+                <a:sym typeface="+mn-ea"/>
+              </a:rPr>
+              <a:t>EKF-MC2: 25 cm</a:t>
+            </a:r>
+            <a:endParaRPr lang="de-DE" altLang="zh-CN" sz="1600">
+              <a:solidFill>
+                <a:schemeClr val="dk1"/>
+              </a:solidFill>
+              <a:latin typeface="Times New Roman" panose="02020603050405020304" charset="0"/>
+              <a:sym typeface="+mn-ea"/>
+            </a:endParaRPr>
+          </a:p>
+        </p:txBody>
+      </p:sp>
+      <p:sp>
+        <p:nvSpPr>
+          <p:cNvPr id="31" name="文本框 30"/>
+          <p:cNvSpPr txBox="1"/>
+          <p:nvPr/>
+        </p:nvSpPr>
+        <p:spPr>
+          <a:xfrm>
+            <a:off x="2651760" y="2936240"/>
+            <a:ext cx="1582420" cy="368300"/>
+          </a:xfrm>
+          <a:prstGeom prst="rect">
+            <a:avLst/>
+          </a:prstGeom>
+          <a:noFill/>
+        </p:spPr>
+        <p:txBody>
+          <a:bodyPr wrap="square" rtlCol="0">
+            <a:spAutoFit/>
+          </a:bodyPr>
+          <a:p>
+            <a:pPr lvl="0" algn="l"/>
+            <a:r>
+              <a:rPr lang="de-DE" altLang="zh-CN">
+                <a:solidFill>
+                  <a:schemeClr val="dk1"/>
+                </a:solidFill>
+                <a:latin typeface="Times New Roman" panose="02020603050405020304" charset="0"/>
+                <a:sym typeface="+mn-ea"/>
+              </a:rPr>
+              <a:t>[7][8]: 10 cm</a:t>
+            </a:r>
+            <a:endParaRPr lang="de-DE" altLang="zh-CN">
+              <a:solidFill>
+                <a:schemeClr val="dk1"/>
+              </a:solidFill>
+              <a:latin typeface="Times New Roman" panose="02020603050405020304" charset="0"/>
+              <a:sym typeface="+mn-ea"/>
+            </a:endParaRPr>
+          </a:p>
+        </p:txBody>
+      </p:sp>
+      <p:sp>
+        <p:nvSpPr>
+          <p:cNvPr id="32" name="文本框 31"/>
+          <p:cNvSpPr txBox="1"/>
+          <p:nvPr/>
+        </p:nvSpPr>
+        <p:spPr>
+          <a:xfrm>
+            <a:off x="5285740" y="2936240"/>
+            <a:ext cx="3392170" cy="368300"/>
+          </a:xfrm>
+          <a:prstGeom prst="rect">
+            <a:avLst/>
+          </a:prstGeom>
+          <a:noFill/>
+        </p:spPr>
+        <p:txBody>
+          <a:bodyPr wrap="square" rtlCol="0">
+            <a:spAutoFit/>
+          </a:bodyPr>
+          <a:p>
+            <a:pPr algn="l">
+              <a:buNone/>
+            </a:pPr>
+            <a:r>
+              <a:rPr lang="de-DE" altLang="zh-CN" sz="1800">
+                <a:solidFill>
+                  <a:schemeClr val="dk1"/>
+                </a:solidFill>
+                <a:latin typeface="Times New Roman" panose="02020603050405020304" charset="0"/>
+                <a:sym typeface="+mn-ea"/>
+              </a:rPr>
+              <a:t>ASSIST [11]: 29 cm</a:t>
+            </a:r>
+            <a:endParaRPr lang="de-DE" altLang="zh-CN" sz="1800">
+              <a:solidFill>
+                <a:schemeClr val="dk1"/>
+              </a:solidFill>
+              <a:latin typeface="Times New Roman" panose="02020603050405020304" charset="0"/>
+              <a:sym typeface="+mn-ea"/>
+            </a:endParaRPr>
+          </a:p>
+        </p:txBody>
+      </p:sp>
+      <p:sp>
+        <p:nvSpPr>
+          <p:cNvPr id="33" name="文本框 32"/>
+          <p:cNvSpPr txBox="1"/>
+          <p:nvPr/>
+        </p:nvSpPr>
+        <p:spPr>
+          <a:xfrm>
+            <a:off x="3329305" y="1870710"/>
+            <a:ext cx="3392170" cy="368300"/>
+          </a:xfrm>
+          <a:prstGeom prst="rect">
+            <a:avLst/>
+          </a:prstGeom>
+          <a:noFill/>
+        </p:spPr>
+        <p:txBody>
+          <a:bodyPr wrap="square" rtlCol="0">
+            <a:spAutoFit/>
+          </a:bodyPr>
+          <a:p>
+            <a:pPr algn="l"/>
+            <a:r>
+              <a:rPr lang="de-DE" altLang="zh-CN" sz="1800">
+                <a:solidFill>
+                  <a:schemeClr val="dk1"/>
+                </a:solidFill>
+                <a:latin typeface="Times New Roman" panose="02020603050405020304" charset="0"/>
+                <a:sym typeface="+mn-ea"/>
+              </a:rPr>
+              <a:t>ArrayTrack [11] : 23 cm</a:t>
+            </a:r>
+            <a:endParaRPr lang="de-DE" altLang="zh-CN" sz="2800" b="1">
+              <a:sym typeface="+mn-ea"/>
+            </a:endParaRPr>
+          </a:p>
+        </p:txBody>
+      </p:sp>
+      <p:sp>
+        <p:nvSpPr>
+          <p:cNvPr id="34" name="文本框 33"/>
+          <p:cNvSpPr txBox="1"/>
+          <p:nvPr/>
+        </p:nvSpPr>
+        <p:spPr>
+          <a:xfrm>
+            <a:off x="5774690" y="2403475"/>
+            <a:ext cx="3392170" cy="368300"/>
+          </a:xfrm>
+          <a:prstGeom prst="rect">
+            <a:avLst/>
+          </a:prstGeom>
+          <a:noFill/>
+        </p:spPr>
+        <p:txBody>
+          <a:bodyPr wrap="square" rtlCol="0">
+            <a:spAutoFit/>
+          </a:bodyPr>
+          <a:p>
+            <a:pPr algn="l"/>
+            <a:r>
+              <a:rPr lang="de-DE" altLang="zh-CN">
+                <a:solidFill>
+                  <a:schemeClr val="dk1"/>
+                </a:solidFill>
+                <a:latin typeface="Times New Roman" panose="02020603050405020304" charset="0"/>
+                <a:sym typeface="+mn-ea"/>
+              </a:rPr>
+              <a:t>Ubicarse [11] : 39 cm</a:t>
+            </a:r>
+            <a:endParaRPr lang="de-DE" altLang="zh-CN" sz="1800">
+              <a:solidFill>
+                <a:schemeClr val="dk1"/>
+              </a:solidFill>
+              <a:latin typeface="Times New Roman" panose="02020603050405020304" charset="0"/>
+              <a:sym typeface="+mn-ea"/>
+            </a:endParaRPr>
+          </a:p>
+        </p:txBody>
+      </p:sp>
+      <p:sp>
+        <p:nvSpPr>
+          <p:cNvPr id="35" name="文本框 34"/>
+          <p:cNvSpPr txBox="1"/>
+          <p:nvPr/>
+        </p:nvSpPr>
+        <p:spPr>
+          <a:xfrm>
+            <a:off x="8442325" y="1023620"/>
+            <a:ext cx="3392170" cy="368300"/>
+          </a:xfrm>
+          <a:prstGeom prst="rect">
+            <a:avLst/>
+          </a:prstGeom>
+          <a:noFill/>
+        </p:spPr>
+        <p:txBody>
+          <a:bodyPr wrap="square" rtlCol="0">
+            <a:spAutoFit/>
+          </a:bodyPr>
+          <a:p>
+            <a:pPr lvl="0" algn="l"/>
+            <a:r>
+              <a:rPr lang="de-DE" altLang="zh-CN">
+                <a:solidFill>
+                  <a:schemeClr val="dk1"/>
+                </a:solidFill>
+                <a:latin typeface="Times New Roman" panose="02020603050405020304" charset="0"/>
+                <a:sym typeface="+mn-ea"/>
+              </a:rPr>
+              <a:t>[3] : 190 cm</a:t>
+            </a:r>
+            <a:endParaRPr lang="de-DE" altLang="zh-CN">
+              <a:solidFill>
+                <a:schemeClr val="dk1"/>
+              </a:solidFill>
+              <a:latin typeface="Times New Roman" panose="02020603050405020304" charset="0"/>
+              <a:sym typeface="+mn-ea"/>
+            </a:endParaRPr>
+          </a:p>
+        </p:txBody>
+      </p:sp>
+      <p:sp>
+        <p:nvSpPr>
+          <p:cNvPr id="36" name="文本框 35"/>
+          <p:cNvSpPr txBox="1"/>
+          <p:nvPr/>
+        </p:nvSpPr>
+        <p:spPr>
+          <a:xfrm>
+            <a:off x="10451465" y="1015365"/>
+            <a:ext cx="3392170" cy="368300"/>
+          </a:xfrm>
+          <a:prstGeom prst="rect">
+            <a:avLst/>
+          </a:prstGeom>
+          <a:noFill/>
+        </p:spPr>
+        <p:txBody>
+          <a:bodyPr wrap="square" rtlCol="0">
+            <a:spAutoFit/>
+          </a:bodyPr>
+          <a:p>
+            <a:pPr lvl="0" algn="l"/>
+            <a:r>
+              <a:rPr lang="de-DE" altLang="zh-CN">
+                <a:solidFill>
+                  <a:schemeClr val="dk1"/>
+                </a:solidFill>
+                <a:latin typeface="Times New Roman" panose="02020603050405020304" charset="0"/>
+                <a:sym typeface="+mn-ea"/>
+              </a:rPr>
+              <a:t>[2] : 490 cm</a:t>
+            </a:r>
+            <a:endParaRPr lang="de-DE" altLang="zh-CN">
+              <a:solidFill>
+                <a:schemeClr val="dk1"/>
+              </a:solidFill>
+              <a:latin typeface="Times New Roman" panose="02020603050405020304" charset="0"/>
+              <a:sym typeface="+mn-ea"/>
+            </a:endParaRPr>
           </a:p>
         </p:txBody>
       </p:sp>

</xml_diff>